<commit_message>
DDP Alphabet of Lines Update
</commit_message>
<xml_diff>
--- a/High School/Design and Drawing for Production/Unit 4 - The Alphabet of Lines/Section 1 - Introduction to Alphabet of Lines/Assets/Unit 4 - Section 1 - Introduction to Alphabet of Line.pptx
+++ b/High School/Design and Drawing for Production/Unit 4 - The Alphabet of Lines/Section 1 - Introduction to Alphabet of Lines/Assets/Unit 4 - Section 1 - Introduction to Alphabet of Line.pptx
@@ -5,10 +5,10 @@
     <p:sldMasterId id="2147483735" r:id="rId1"/>
   </p:sldMasterIdLst>
   <p:notesMasterIdLst>
-    <p:notesMasterId r:id="rId25"/>
+    <p:notesMasterId r:id="rId27"/>
   </p:notesMasterIdLst>
   <p:handoutMasterIdLst>
-    <p:handoutMasterId r:id="rId26"/>
+    <p:handoutMasterId r:id="rId28"/>
   </p:handoutMasterIdLst>
   <p:sldIdLst>
     <p:sldId id="268" r:id="rId2"/>
@@ -34,6 +34,8 @@
     <p:sldId id="281" r:id="rId22"/>
     <p:sldId id="277" r:id="rId23"/>
     <p:sldId id="278" r:id="rId24"/>
+    <p:sldId id="293" r:id="rId25"/>
+    <p:sldId id="294" r:id="rId26"/>
   </p:sldIdLst>
   <p:sldSz cx="12192000" cy="6858000"/>
   <p:notesSz cx="6858000" cy="9144000"/>
@@ -236,7 +238,7 @@
           <a:p>
             <a:fld id="{6AC4FB8F-ED15-48AB-97BD-17129D4E699D}" type="datetimeFigureOut">
               <a:rPr lang="en-US" smtClean="0"/>
-              <a:t>10/15/2018</a:t>
+              <a:t>10/16/2018</a:t>
             </a:fld>
             <a:endParaRPr lang="en-US" dirty="0"/>
           </a:p>
@@ -401,7 +403,7 @@
           <a:p>
             <a:fld id="{BBC9D437-CD83-4825-AD0D-5E7B341BC79B}" type="datetimeFigureOut">
               <a:rPr lang="en-US" smtClean="0"/>
-              <a:t>10/15/2018</a:t>
+              <a:t>10/16/2018</a:t>
             </a:fld>
             <a:endParaRPr lang="en-US" dirty="0"/>
           </a:p>
@@ -859,7 +861,7 @@
           <a:p>
             <a:fld id="{85AB7CBB-843F-464A-A764-71D6ADC27CFA}" type="datetime1">
               <a:rPr lang="en-US" smtClean="0"/>
-              <a:t>10/15/2018</a:t>
+              <a:t>10/16/2018</a:t>
             </a:fld>
             <a:endParaRPr lang="en-US" dirty="0"/>
           </a:p>
@@ -1312,7 +1314,7 @@
           <a:p>
             <a:fld id="{3F138946-C5C1-4A11-BA69-F12F43F8A94B}" type="datetime1">
               <a:rPr lang="en-US" smtClean="0"/>
-              <a:t>10/15/2018</a:t>
+              <a:t>10/16/2018</a:t>
             </a:fld>
             <a:endParaRPr lang="en-US" dirty="0"/>
           </a:p>
@@ -1568,7 +1570,7 @@
           <a:p>
             <a:fld id="{3F138946-C5C1-4A11-BA69-F12F43F8A94B}" type="datetime1">
               <a:rPr lang="en-US" smtClean="0"/>
-              <a:t>10/15/2018</a:t>
+              <a:t>10/16/2018</a:t>
             </a:fld>
             <a:endParaRPr lang="en-US" dirty="0"/>
           </a:p>
@@ -1882,7 +1884,7 @@
           <a:p>
             <a:fld id="{3F138946-C5C1-4A11-BA69-F12F43F8A94B}" type="datetime1">
               <a:rPr lang="en-US" smtClean="0"/>
-              <a:t>10/15/2018</a:t>
+              <a:t>10/16/2018</a:t>
             </a:fld>
             <a:endParaRPr lang="en-US" dirty="0"/>
           </a:p>
@@ -2206,7 +2208,7 @@
           <a:p>
             <a:fld id="{3F138946-C5C1-4A11-BA69-F12F43F8A94B}" type="datetime1">
               <a:rPr lang="en-US" smtClean="0"/>
-              <a:t>10/15/2018</a:t>
+              <a:t>10/16/2018</a:t>
             </a:fld>
             <a:endParaRPr lang="en-US" dirty="0"/>
           </a:p>
@@ -2514,7 +2516,7 @@
           <a:p>
             <a:fld id="{3F138946-C5C1-4A11-BA69-F12F43F8A94B}" type="datetime1">
               <a:rPr lang="en-US" smtClean="0"/>
-              <a:t>10/15/2018</a:t>
+              <a:t>10/16/2018</a:t>
             </a:fld>
             <a:endParaRPr lang="en-US" dirty="0"/>
           </a:p>
@@ -2887,7 +2889,7 @@
           <a:p>
             <a:fld id="{3F138946-C5C1-4A11-BA69-F12F43F8A94B}" type="datetime1">
               <a:rPr lang="en-US" smtClean="0"/>
-              <a:t>10/15/2018</a:t>
+              <a:t>10/16/2018</a:t>
             </a:fld>
             <a:endParaRPr lang="en-US" dirty="0"/>
           </a:p>
@@ -3067,7 +3069,7 @@
           <a:p>
             <a:fld id="{CBEFC03D-3A1F-4813-9337-02411FCC3A9A}" type="datetime1">
               <a:rPr lang="en-US" smtClean="0"/>
-              <a:t>10/15/2018</a:t>
+              <a:t>10/16/2018</a:t>
             </a:fld>
             <a:endParaRPr lang="en-US" dirty="0"/>
           </a:p>
@@ -3263,7 +3265,7 @@
           <a:p>
             <a:fld id="{3D638F79-DFA0-4C26-9553-23A017B69AB6}" type="datetime1">
               <a:rPr lang="en-US" smtClean="0"/>
-              <a:t>10/15/2018</a:t>
+              <a:t>10/16/2018</a:t>
             </a:fld>
             <a:endParaRPr lang="en-US" dirty="0"/>
           </a:p>
@@ -3374,7 +3376,7 @@
           <a:p>
             <a:fld id="{AA615CA6-EC4D-4728-8AA6-534BE7E9B67C}" type="datetime1">
               <a:rPr lang="en-US" smtClean="0"/>
-              <a:t>10/15/2018</a:t>
+              <a:t>10/16/2018</a:t>
             </a:fld>
             <a:endParaRPr lang="en-US" dirty="0"/>
           </a:p>
@@ -3559,7 +3561,7 @@
           <a:p>
             <a:fld id="{A70B34E7-E1D9-4FBF-A1A0-4009669A00BF}" type="datetime1">
               <a:rPr lang="en-US" smtClean="0"/>
-              <a:t>10/15/2018</a:t>
+              <a:t>10/16/2018</a:t>
             </a:fld>
             <a:endParaRPr lang="en-US" dirty="0"/>
           </a:p>
@@ -3826,7 +3828,7 @@
           <a:p>
             <a:fld id="{C50FD434-5945-4FAF-A8C0-DAE9905532CE}" type="datetimeFigureOut">
               <a:rPr lang="en-US" smtClean="0"/>
-              <a:t>10/15/2018</a:t>
+              <a:t>10/16/2018</a:t>
             </a:fld>
             <a:endParaRPr lang="en-US"/>
           </a:p>
@@ -4074,7 +4076,7 @@
           <a:p>
             <a:fld id="{7579E8B6-2F47-420B-83EA-EB2285D13EC9}" type="datetime1">
               <a:rPr lang="en-US" smtClean="0"/>
-              <a:t>10/15/2018</a:t>
+              <a:t>10/16/2018</a:t>
             </a:fld>
             <a:endParaRPr lang="en-US" dirty="0"/>
           </a:p>
@@ -4472,7 +4474,7 @@
           <a:p>
             <a:fld id="{2304803D-B10E-4B90-8456-A0E05393E233}" type="datetime1">
               <a:rPr lang="en-US" smtClean="0"/>
-              <a:t>10/15/2018</a:t>
+              <a:t>10/16/2018</a:t>
             </a:fld>
             <a:endParaRPr lang="en-US" dirty="0"/>
           </a:p>
@@ -4606,7 +4608,7 @@
           <a:p>
             <a:fld id="{CCE1E62F-6CCE-4064-96C2-2084AF883904}" type="datetime1">
               <a:rPr lang="en-US" smtClean="0"/>
-              <a:t>10/15/2018</a:t>
+              <a:t>10/16/2018</a:t>
             </a:fld>
             <a:endParaRPr lang="en-US" dirty="0"/>
           </a:p>
@@ -4717,7 +4719,7 @@
           <a:p>
             <a:fld id="{AA615CA6-EC4D-4728-8AA6-534BE7E9B67C}" type="datetime1">
               <a:rPr lang="en-US" smtClean="0"/>
-              <a:t>10/15/2018</a:t>
+              <a:t>10/16/2018</a:t>
             </a:fld>
             <a:endParaRPr lang="en-US" dirty="0"/>
           </a:p>
@@ -4988,7 +4990,7 @@
           <a:p>
             <a:fld id="{A6139942-0A2E-443A-842F-D6DE74360370}" type="datetime1">
               <a:rPr lang="en-US" smtClean="0"/>
-              <a:t>10/15/2018</a:t>
+              <a:t>10/16/2018</a:t>
             </a:fld>
             <a:endParaRPr lang="en-US" dirty="0"/>
           </a:p>
@@ -5287,7 +5289,7 @@
           <a:p>
             <a:fld id="{C50FD434-5945-4FAF-A8C0-DAE9905532CE}" type="datetimeFigureOut">
               <a:rPr lang="en-US" smtClean="0"/>
-              <a:t>10/15/2018</a:t>
+              <a:t>10/16/2018</a:t>
             </a:fld>
             <a:endParaRPr lang="en-US"/>
           </a:p>
@@ -5757,7 +5759,7 @@
           <a:p>
             <a:fld id="{3F138946-C5C1-4A11-BA69-F12F43F8A94B}" type="datetime1">
               <a:rPr lang="en-US" smtClean="0"/>
-              <a:t>10/15/2018</a:t>
+              <a:t>10/16/2018</a:t>
             </a:fld>
             <a:endParaRPr lang="en-US" dirty="0"/>
           </a:p>
@@ -12175,6 +12177,232 @@
     <p:extLst>
       <p:ext uri="{BB962C8B-B14F-4D97-AF65-F5344CB8AC3E}">
         <p14:creationId xmlns:p14="http://schemas.microsoft.com/office/powerpoint/2010/main" val="13902868"/>
+      </p:ext>
+    </p:extLst>
+  </p:cSld>
+  <p:clrMapOvr>
+    <a:masterClrMapping/>
+  </p:clrMapOvr>
+  <mc:AlternateContent xmlns:mc="http://schemas.openxmlformats.org/markup-compatibility/2006" xmlns:p14="http://schemas.microsoft.com/office/powerpoint/2010/main">
+    <mc:Choice Requires="p14">
+      <p:transition spd="med" p14:dur="700">
+        <p:fade/>
+      </p:transition>
+    </mc:Choice>
+    <mc:Fallback xmlns="">
+      <p:transition spd="med">
+        <p:fade/>
+      </p:transition>
+    </mc:Fallback>
+  </mc:AlternateContent>
+</p:sld>
+</file>
+
+<file path=ppt/slides/slide24.xml><?xml version="1.0" encoding="utf-8"?>
+<p:sld xmlns:a="http://schemas.openxmlformats.org/drawingml/2006/main" xmlns:r="http://schemas.openxmlformats.org/officeDocument/2006/relationships" xmlns:p="http://schemas.openxmlformats.org/presentationml/2006/main">
+  <p:cSld>
+    <p:spTree>
+      <p:nvGrpSpPr>
+        <p:cNvPr id="1" name=""/>
+        <p:cNvGrpSpPr/>
+        <p:nvPr/>
+      </p:nvGrpSpPr>
+      <p:grpSpPr>
+        <a:xfrm>
+          <a:off x="0" y="0"/>
+          <a:ext cx="0" cy="0"/>
+          <a:chOff x="0" y="0"/>
+          <a:chExt cx="0" cy="0"/>
+        </a:xfrm>
+      </p:grpSpPr>
+      <p:sp>
+        <p:nvSpPr>
+          <p:cNvPr id="5" name="Title 4">
+            <a:extLst>
+              <a:ext uri="{FF2B5EF4-FFF2-40B4-BE49-F238E27FC236}">
+                <a16:creationId xmlns:a16="http://schemas.microsoft.com/office/drawing/2014/main" id="{4367301C-9E62-4A97-A776-7C2F6EAEAB9B}"/>
+              </a:ext>
+            </a:extLst>
+          </p:cNvPr>
+          <p:cNvSpPr>
+            <a:spLocks noGrp="1"/>
+          </p:cNvSpPr>
+          <p:nvPr>
+            <p:ph type="title"/>
+          </p:nvPr>
+        </p:nvSpPr>
+        <p:spPr/>
+        <p:txBody>
+          <a:bodyPr/>
+          <a:lstStyle/>
+          <a:p>
+            <a:r>
+              <a:rPr lang="en-US" dirty="0"/>
+              <a:t>LP 2</a:t>
+            </a:r>
+          </a:p>
+        </p:txBody>
+      </p:sp>
+      <p:sp>
+        <p:nvSpPr>
+          <p:cNvPr id="4" name="Footer Placeholder 3">
+            <a:extLst>
+              <a:ext uri="{FF2B5EF4-FFF2-40B4-BE49-F238E27FC236}">
+                <a16:creationId xmlns:a16="http://schemas.microsoft.com/office/drawing/2014/main" id="{79004010-F763-427D-8147-B73D87274D90}"/>
+              </a:ext>
+            </a:extLst>
+          </p:cNvPr>
+          <p:cNvSpPr>
+            <a:spLocks noGrp="1"/>
+          </p:cNvSpPr>
+          <p:nvPr>
+            <p:ph type="ftr" sz="quarter" idx="11"/>
+          </p:nvPr>
+        </p:nvSpPr>
+        <p:spPr/>
+        <p:txBody>
+          <a:bodyPr/>
+          <a:lstStyle/>
+          <a:p>
+            <a:r>
+              <a:rPr lang="en-US"/>
+              <a:t>Add a footer</a:t>
+            </a:r>
+            <a:endParaRPr lang="en-US" dirty="0"/>
+          </a:p>
+        </p:txBody>
+      </p:sp>
+    </p:spTree>
+    <p:extLst>
+      <p:ext uri="{BB962C8B-B14F-4D97-AF65-F5344CB8AC3E}">
+        <p14:creationId xmlns:p14="http://schemas.microsoft.com/office/powerpoint/2010/main" val="3019454519"/>
+      </p:ext>
+    </p:extLst>
+  </p:cSld>
+  <p:clrMapOvr>
+    <a:masterClrMapping/>
+  </p:clrMapOvr>
+  <mc:AlternateContent xmlns:mc="http://schemas.openxmlformats.org/markup-compatibility/2006" xmlns:p14="http://schemas.microsoft.com/office/powerpoint/2010/main">
+    <mc:Choice Requires="p14">
+      <p:transition spd="med" p14:dur="700">
+        <p:fade/>
+      </p:transition>
+    </mc:Choice>
+    <mc:Fallback xmlns="">
+      <p:transition spd="med">
+        <p:fade/>
+      </p:transition>
+    </mc:Fallback>
+  </mc:AlternateContent>
+</p:sld>
+</file>
+
+<file path=ppt/slides/slide25.xml><?xml version="1.0" encoding="utf-8"?>
+<p:sld xmlns:a="http://schemas.openxmlformats.org/drawingml/2006/main" xmlns:r="http://schemas.openxmlformats.org/officeDocument/2006/relationships" xmlns:p="http://schemas.openxmlformats.org/presentationml/2006/main">
+  <p:cSld>
+    <p:spTree>
+      <p:nvGrpSpPr>
+        <p:cNvPr id="1" name=""/>
+        <p:cNvGrpSpPr/>
+        <p:nvPr/>
+      </p:nvGrpSpPr>
+      <p:grpSpPr>
+        <a:xfrm>
+          <a:off x="0" y="0"/>
+          <a:ext cx="0" cy="0"/>
+          <a:chOff x="0" y="0"/>
+          <a:chExt cx="0" cy="0"/>
+        </a:xfrm>
+      </p:grpSpPr>
+      <p:sp>
+        <p:nvSpPr>
+          <p:cNvPr id="4" name="Title 3">
+            <a:extLst>
+              <a:ext uri="{FF2B5EF4-FFF2-40B4-BE49-F238E27FC236}">
+                <a16:creationId xmlns:a16="http://schemas.microsoft.com/office/drawing/2014/main" id="{07506127-40F4-46B4-AA13-9926B2BD096B}"/>
+              </a:ext>
+            </a:extLst>
+          </p:cNvPr>
+          <p:cNvSpPr>
+            <a:spLocks noGrp="1"/>
+          </p:cNvSpPr>
+          <p:nvPr>
+            <p:ph type="ctrTitle"/>
+          </p:nvPr>
+        </p:nvSpPr>
+        <p:spPr/>
+        <p:txBody>
+          <a:bodyPr/>
+          <a:lstStyle/>
+          <a:p>
+            <a:r>
+              <a:rPr lang="en-US" dirty="0"/>
+              <a:t>Alphabet of Lines</a:t>
+            </a:r>
+          </a:p>
+        </p:txBody>
+      </p:sp>
+      <p:sp>
+        <p:nvSpPr>
+          <p:cNvPr id="5" name="Subtitle 4">
+            <a:extLst>
+              <a:ext uri="{FF2B5EF4-FFF2-40B4-BE49-F238E27FC236}">
+                <a16:creationId xmlns:a16="http://schemas.microsoft.com/office/drawing/2014/main" id="{BBBCF47C-CE96-46DF-9B20-6EF8EEE99D3F}"/>
+              </a:ext>
+            </a:extLst>
+          </p:cNvPr>
+          <p:cNvSpPr>
+            <a:spLocks noGrp="1"/>
+          </p:cNvSpPr>
+          <p:nvPr>
+            <p:ph type="subTitle" idx="1"/>
+          </p:nvPr>
+        </p:nvSpPr>
+        <p:spPr/>
+        <p:txBody>
+          <a:bodyPr/>
+          <a:lstStyle/>
+          <a:p>
+            <a:r>
+              <a:rPr lang="en-US" dirty="0"/>
+              <a:t>Drawing #8</a:t>
+            </a:r>
+          </a:p>
+        </p:txBody>
+      </p:sp>
+      <p:sp>
+        <p:nvSpPr>
+          <p:cNvPr id="3" name="Footer Placeholder 2">
+            <a:extLst>
+              <a:ext uri="{FF2B5EF4-FFF2-40B4-BE49-F238E27FC236}">
+                <a16:creationId xmlns:a16="http://schemas.microsoft.com/office/drawing/2014/main" id="{1C8B0826-5E65-4731-9543-60C266E8708C}"/>
+              </a:ext>
+            </a:extLst>
+          </p:cNvPr>
+          <p:cNvSpPr>
+            <a:spLocks noGrp="1"/>
+          </p:cNvSpPr>
+          <p:nvPr>
+            <p:ph type="ftr" sz="quarter" idx="11"/>
+          </p:nvPr>
+        </p:nvSpPr>
+        <p:spPr/>
+        <p:txBody>
+          <a:bodyPr/>
+          <a:lstStyle/>
+          <a:p>
+            <a:r>
+              <a:rPr lang="en-US"/>
+              <a:t>Add a footer</a:t>
+            </a:r>
+            <a:endParaRPr lang="en-US" dirty="0"/>
+          </a:p>
+        </p:txBody>
+      </p:sp>
+    </p:spTree>
+    <p:extLst>
+      <p:ext uri="{BB962C8B-B14F-4D97-AF65-F5344CB8AC3E}">
+        <p14:creationId xmlns:p14="http://schemas.microsoft.com/office/powerpoint/2010/main" val="1448505036"/>
       </p:ext>
     </p:extLst>
   </p:cSld>

</xml_diff>

<commit_message>
Update Drawing #8 asset
</commit_message>
<xml_diff>
--- a/High School/Design and Drawing for Production/Unit 4 - The Alphabet of Lines/Section 1 - Introduction to Alphabet of Lines/Assets/Unit 4 - Section 1 - Introduction to Alphabet of Line.pptx
+++ b/High School/Design and Drawing for Production/Unit 4 - The Alphabet of Lines/Section 1 - Introduction to Alphabet of Lines/Assets/Unit 4 - Section 1 - Introduction to Alphabet of Line.pptx
@@ -5,10 +5,10 @@
     <p:sldMasterId id="2147483735" r:id="rId1"/>
   </p:sldMasterIdLst>
   <p:notesMasterIdLst>
-    <p:notesMasterId r:id="rId28"/>
+    <p:notesMasterId r:id="rId30"/>
   </p:notesMasterIdLst>
   <p:handoutMasterIdLst>
-    <p:handoutMasterId r:id="rId29"/>
+    <p:handoutMasterId r:id="rId31"/>
   </p:handoutMasterIdLst>
   <p:sldIdLst>
     <p:sldId id="268" r:id="rId2"/>
@@ -37,6 +37,8 @@
     <p:sldId id="293" r:id="rId25"/>
     <p:sldId id="295" r:id="rId26"/>
     <p:sldId id="294" r:id="rId27"/>
+    <p:sldId id="296" r:id="rId28"/>
+    <p:sldId id="297" r:id="rId29"/>
   </p:sldIdLst>
   <p:sldSz cx="12192000" cy="6858000"/>
   <p:notesSz cx="6858000" cy="9144000"/>
@@ -239,7 +241,7 @@
           <a:p>
             <a:fld id="{6AC4FB8F-ED15-48AB-97BD-17129D4E699D}" type="datetimeFigureOut">
               <a:rPr lang="en-US" smtClean="0"/>
-              <a:t>10/16/2018</a:t>
+              <a:t>10/17/2018</a:t>
             </a:fld>
             <a:endParaRPr lang="en-US" dirty="0"/>
           </a:p>
@@ -404,7 +406,7 @@
           <a:p>
             <a:fld id="{BBC9D437-CD83-4825-AD0D-5E7B341BC79B}" type="datetimeFigureOut">
               <a:rPr lang="en-US" smtClean="0"/>
-              <a:t>10/16/2018</a:t>
+              <a:t>10/17/2018</a:t>
             </a:fld>
             <a:endParaRPr lang="en-US" dirty="0"/>
           </a:p>
@@ -862,7 +864,7 @@
           <a:p>
             <a:fld id="{85AB7CBB-843F-464A-A764-71D6ADC27CFA}" type="datetime1">
               <a:rPr lang="en-US" smtClean="0"/>
-              <a:t>10/16/2018</a:t>
+              <a:t>10/17/2018</a:t>
             </a:fld>
             <a:endParaRPr lang="en-US" dirty="0"/>
           </a:p>
@@ -1315,7 +1317,7 @@
           <a:p>
             <a:fld id="{3F138946-C5C1-4A11-BA69-F12F43F8A94B}" type="datetime1">
               <a:rPr lang="en-US" smtClean="0"/>
-              <a:t>10/16/2018</a:t>
+              <a:t>10/17/2018</a:t>
             </a:fld>
             <a:endParaRPr lang="en-US" dirty="0"/>
           </a:p>
@@ -1571,7 +1573,7 @@
           <a:p>
             <a:fld id="{3F138946-C5C1-4A11-BA69-F12F43F8A94B}" type="datetime1">
               <a:rPr lang="en-US" smtClean="0"/>
-              <a:t>10/16/2018</a:t>
+              <a:t>10/17/2018</a:t>
             </a:fld>
             <a:endParaRPr lang="en-US" dirty="0"/>
           </a:p>
@@ -1885,7 +1887,7 @@
           <a:p>
             <a:fld id="{3F138946-C5C1-4A11-BA69-F12F43F8A94B}" type="datetime1">
               <a:rPr lang="en-US" smtClean="0"/>
-              <a:t>10/16/2018</a:t>
+              <a:t>10/17/2018</a:t>
             </a:fld>
             <a:endParaRPr lang="en-US" dirty="0"/>
           </a:p>
@@ -2209,7 +2211,7 @@
           <a:p>
             <a:fld id="{3F138946-C5C1-4A11-BA69-F12F43F8A94B}" type="datetime1">
               <a:rPr lang="en-US" smtClean="0"/>
-              <a:t>10/16/2018</a:t>
+              <a:t>10/17/2018</a:t>
             </a:fld>
             <a:endParaRPr lang="en-US" dirty="0"/>
           </a:p>
@@ -2517,7 +2519,7 @@
           <a:p>
             <a:fld id="{3F138946-C5C1-4A11-BA69-F12F43F8A94B}" type="datetime1">
               <a:rPr lang="en-US" smtClean="0"/>
-              <a:t>10/16/2018</a:t>
+              <a:t>10/17/2018</a:t>
             </a:fld>
             <a:endParaRPr lang="en-US" dirty="0"/>
           </a:p>
@@ -2890,7 +2892,7 @@
           <a:p>
             <a:fld id="{3F138946-C5C1-4A11-BA69-F12F43F8A94B}" type="datetime1">
               <a:rPr lang="en-US" smtClean="0"/>
-              <a:t>10/16/2018</a:t>
+              <a:t>10/17/2018</a:t>
             </a:fld>
             <a:endParaRPr lang="en-US" dirty="0"/>
           </a:p>
@@ -3070,7 +3072,7 @@
           <a:p>
             <a:fld id="{CBEFC03D-3A1F-4813-9337-02411FCC3A9A}" type="datetime1">
               <a:rPr lang="en-US" smtClean="0"/>
-              <a:t>10/16/2018</a:t>
+              <a:t>10/17/2018</a:t>
             </a:fld>
             <a:endParaRPr lang="en-US" dirty="0"/>
           </a:p>
@@ -3266,7 +3268,7 @@
           <a:p>
             <a:fld id="{3D638F79-DFA0-4C26-9553-23A017B69AB6}" type="datetime1">
               <a:rPr lang="en-US" smtClean="0"/>
-              <a:t>10/16/2018</a:t>
+              <a:t>10/17/2018</a:t>
             </a:fld>
             <a:endParaRPr lang="en-US" dirty="0"/>
           </a:p>
@@ -3377,7 +3379,7 @@
           <a:p>
             <a:fld id="{AA615CA6-EC4D-4728-8AA6-534BE7E9B67C}" type="datetime1">
               <a:rPr lang="en-US" smtClean="0"/>
-              <a:t>10/16/2018</a:t>
+              <a:t>10/17/2018</a:t>
             </a:fld>
             <a:endParaRPr lang="en-US" dirty="0"/>
           </a:p>
@@ -3562,7 +3564,7 @@
           <a:p>
             <a:fld id="{A70B34E7-E1D9-4FBF-A1A0-4009669A00BF}" type="datetime1">
               <a:rPr lang="en-US" smtClean="0"/>
-              <a:t>10/16/2018</a:t>
+              <a:t>10/17/2018</a:t>
             </a:fld>
             <a:endParaRPr lang="en-US" dirty="0"/>
           </a:p>
@@ -3829,7 +3831,7 @@
           <a:p>
             <a:fld id="{C50FD434-5945-4FAF-A8C0-DAE9905532CE}" type="datetimeFigureOut">
               <a:rPr lang="en-US" smtClean="0"/>
-              <a:t>10/16/2018</a:t>
+              <a:t>10/17/2018</a:t>
             </a:fld>
             <a:endParaRPr lang="en-US"/>
           </a:p>
@@ -4077,7 +4079,7 @@
           <a:p>
             <a:fld id="{7579E8B6-2F47-420B-83EA-EB2285D13EC9}" type="datetime1">
               <a:rPr lang="en-US" smtClean="0"/>
-              <a:t>10/16/2018</a:t>
+              <a:t>10/17/2018</a:t>
             </a:fld>
             <a:endParaRPr lang="en-US" dirty="0"/>
           </a:p>
@@ -4475,7 +4477,7 @@
           <a:p>
             <a:fld id="{2304803D-B10E-4B90-8456-A0E05393E233}" type="datetime1">
               <a:rPr lang="en-US" smtClean="0"/>
-              <a:t>10/16/2018</a:t>
+              <a:t>10/17/2018</a:t>
             </a:fld>
             <a:endParaRPr lang="en-US" dirty="0"/>
           </a:p>
@@ -4609,7 +4611,7 @@
           <a:p>
             <a:fld id="{CCE1E62F-6CCE-4064-96C2-2084AF883904}" type="datetime1">
               <a:rPr lang="en-US" smtClean="0"/>
-              <a:t>10/16/2018</a:t>
+              <a:t>10/17/2018</a:t>
             </a:fld>
             <a:endParaRPr lang="en-US" dirty="0"/>
           </a:p>
@@ -4720,7 +4722,7 @@
           <a:p>
             <a:fld id="{AA615CA6-EC4D-4728-8AA6-534BE7E9B67C}" type="datetime1">
               <a:rPr lang="en-US" smtClean="0"/>
-              <a:t>10/16/2018</a:t>
+              <a:t>10/17/2018</a:t>
             </a:fld>
             <a:endParaRPr lang="en-US" dirty="0"/>
           </a:p>
@@ -4991,7 +4993,7 @@
           <a:p>
             <a:fld id="{A6139942-0A2E-443A-842F-D6DE74360370}" type="datetime1">
               <a:rPr lang="en-US" smtClean="0"/>
-              <a:t>10/16/2018</a:t>
+              <a:t>10/17/2018</a:t>
             </a:fld>
             <a:endParaRPr lang="en-US" dirty="0"/>
           </a:p>
@@ -5290,7 +5292,7 @@
           <a:p>
             <a:fld id="{C50FD434-5945-4FAF-A8C0-DAE9905532CE}" type="datetimeFigureOut">
               <a:rPr lang="en-US" smtClean="0"/>
-              <a:t>10/16/2018</a:t>
+              <a:t>10/17/2018</a:t>
             </a:fld>
             <a:endParaRPr lang="en-US"/>
           </a:p>
@@ -5760,7 +5762,7 @@
           <a:p>
             <a:fld id="{3F138946-C5C1-4A11-BA69-F12F43F8A94B}" type="datetime1">
               <a:rPr lang="en-US" smtClean="0"/>
-              <a:t>10/16/2018</a:t>
+              <a:t>10/17/2018</a:t>
             </a:fld>
             <a:endParaRPr lang="en-US" dirty="0"/>
           </a:p>
@@ -12569,6 +12571,232 @@
     <p:extLst>
       <p:ext uri="{BB962C8B-B14F-4D97-AF65-F5344CB8AC3E}">
         <p14:creationId xmlns:p14="http://schemas.microsoft.com/office/powerpoint/2010/main" val="1448505036"/>
+      </p:ext>
+    </p:extLst>
+  </p:cSld>
+  <p:clrMapOvr>
+    <a:masterClrMapping/>
+  </p:clrMapOvr>
+  <mc:AlternateContent xmlns:mc="http://schemas.openxmlformats.org/markup-compatibility/2006" xmlns:p14="http://schemas.microsoft.com/office/powerpoint/2010/main">
+    <mc:Choice Requires="p14">
+      <p:transition spd="med" p14:dur="700">
+        <p:fade/>
+      </p:transition>
+    </mc:Choice>
+    <mc:Fallback xmlns="">
+      <p:transition spd="med">
+        <p:fade/>
+      </p:transition>
+    </mc:Fallback>
+  </mc:AlternateContent>
+</p:sld>
+</file>
+
+<file path=ppt/slides/slide27.xml><?xml version="1.0" encoding="utf-8"?>
+<p:sld xmlns:a="http://schemas.openxmlformats.org/drawingml/2006/main" xmlns:r="http://schemas.openxmlformats.org/officeDocument/2006/relationships" xmlns:p="http://schemas.openxmlformats.org/presentationml/2006/main">
+  <p:cSld>
+    <p:spTree>
+      <p:nvGrpSpPr>
+        <p:cNvPr id="1" name=""/>
+        <p:cNvGrpSpPr/>
+        <p:nvPr/>
+      </p:nvGrpSpPr>
+      <p:grpSpPr>
+        <a:xfrm>
+          <a:off x="0" y="0"/>
+          <a:ext cx="0" cy="0"/>
+          <a:chOff x="0" y="0"/>
+          <a:chExt cx="0" cy="0"/>
+        </a:xfrm>
+      </p:grpSpPr>
+      <p:sp>
+        <p:nvSpPr>
+          <p:cNvPr id="5" name="Title 4">
+            <a:extLst>
+              <a:ext uri="{FF2B5EF4-FFF2-40B4-BE49-F238E27FC236}">
+                <a16:creationId xmlns:a16="http://schemas.microsoft.com/office/drawing/2014/main" id="{4367301C-9E62-4A97-A776-7C2F6EAEAB9B}"/>
+              </a:ext>
+            </a:extLst>
+          </p:cNvPr>
+          <p:cNvSpPr>
+            <a:spLocks noGrp="1"/>
+          </p:cNvSpPr>
+          <p:nvPr>
+            <p:ph type="title"/>
+          </p:nvPr>
+        </p:nvSpPr>
+        <p:spPr/>
+        <p:txBody>
+          <a:bodyPr/>
+          <a:lstStyle/>
+          <a:p>
+            <a:r>
+              <a:rPr lang="en-US" dirty="0"/>
+              <a:t>LP 3</a:t>
+            </a:r>
+          </a:p>
+        </p:txBody>
+      </p:sp>
+      <p:sp>
+        <p:nvSpPr>
+          <p:cNvPr id="4" name="Footer Placeholder 3">
+            <a:extLst>
+              <a:ext uri="{FF2B5EF4-FFF2-40B4-BE49-F238E27FC236}">
+                <a16:creationId xmlns:a16="http://schemas.microsoft.com/office/drawing/2014/main" id="{79004010-F763-427D-8147-B73D87274D90}"/>
+              </a:ext>
+            </a:extLst>
+          </p:cNvPr>
+          <p:cNvSpPr>
+            <a:spLocks noGrp="1"/>
+          </p:cNvSpPr>
+          <p:nvPr>
+            <p:ph type="ftr" sz="quarter" idx="11"/>
+          </p:nvPr>
+        </p:nvSpPr>
+        <p:spPr/>
+        <p:txBody>
+          <a:bodyPr/>
+          <a:lstStyle/>
+          <a:p>
+            <a:r>
+              <a:rPr lang="en-US"/>
+              <a:t>Add a footer</a:t>
+            </a:r>
+            <a:endParaRPr lang="en-US" dirty="0"/>
+          </a:p>
+        </p:txBody>
+      </p:sp>
+    </p:spTree>
+    <p:extLst>
+      <p:ext uri="{BB962C8B-B14F-4D97-AF65-F5344CB8AC3E}">
+        <p14:creationId xmlns:p14="http://schemas.microsoft.com/office/powerpoint/2010/main" val="3679690774"/>
+      </p:ext>
+    </p:extLst>
+  </p:cSld>
+  <p:clrMapOvr>
+    <a:masterClrMapping/>
+  </p:clrMapOvr>
+  <mc:AlternateContent xmlns:mc="http://schemas.openxmlformats.org/markup-compatibility/2006" xmlns:p14="http://schemas.microsoft.com/office/powerpoint/2010/main">
+    <mc:Choice Requires="p14">
+      <p:transition spd="med" p14:dur="700">
+        <p:fade/>
+      </p:transition>
+    </mc:Choice>
+    <mc:Fallback xmlns="">
+      <p:transition spd="med">
+        <p:fade/>
+      </p:transition>
+    </mc:Fallback>
+  </mc:AlternateContent>
+</p:sld>
+</file>
+
+<file path=ppt/slides/slide28.xml><?xml version="1.0" encoding="utf-8"?>
+<p:sld xmlns:a="http://schemas.openxmlformats.org/drawingml/2006/main" xmlns:r="http://schemas.openxmlformats.org/officeDocument/2006/relationships" xmlns:p="http://schemas.openxmlformats.org/presentationml/2006/main">
+  <p:cSld>
+    <p:spTree>
+      <p:nvGrpSpPr>
+        <p:cNvPr id="1" name=""/>
+        <p:cNvGrpSpPr/>
+        <p:nvPr/>
+      </p:nvGrpSpPr>
+      <p:grpSpPr>
+        <a:xfrm>
+          <a:off x="0" y="0"/>
+          <a:ext cx="0" cy="0"/>
+          <a:chOff x="0" y="0"/>
+          <a:chExt cx="0" cy="0"/>
+        </a:xfrm>
+      </p:grpSpPr>
+      <p:sp>
+        <p:nvSpPr>
+          <p:cNvPr id="4" name="Title 3">
+            <a:extLst>
+              <a:ext uri="{FF2B5EF4-FFF2-40B4-BE49-F238E27FC236}">
+                <a16:creationId xmlns:a16="http://schemas.microsoft.com/office/drawing/2014/main" id="{07506127-40F4-46B4-AA13-9926B2BD096B}"/>
+              </a:ext>
+            </a:extLst>
+          </p:cNvPr>
+          <p:cNvSpPr>
+            <a:spLocks noGrp="1"/>
+          </p:cNvSpPr>
+          <p:nvPr>
+            <p:ph type="ctrTitle"/>
+          </p:nvPr>
+        </p:nvSpPr>
+        <p:spPr/>
+        <p:txBody>
+          <a:bodyPr/>
+          <a:lstStyle/>
+          <a:p>
+            <a:r>
+              <a:rPr lang="en-US" dirty="0"/>
+              <a:t>Alphabet of Lines</a:t>
+            </a:r>
+          </a:p>
+        </p:txBody>
+      </p:sp>
+      <p:sp>
+        <p:nvSpPr>
+          <p:cNvPr id="5" name="Subtitle 4">
+            <a:extLst>
+              <a:ext uri="{FF2B5EF4-FFF2-40B4-BE49-F238E27FC236}">
+                <a16:creationId xmlns:a16="http://schemas.microsoft.com/office/drawing/2014/main" id="{BBBCF47C-CE96-46DF-9B20-6EF8EEE99D3F}"/>
+              </a:ext>
+            </a:extLst>
+          </p:cNvPr>
+          <p:cNvSpPr>
+            <a:spLocks noGrp="1"/>
+          </p:cNvSpPr>
+          <p:nvPr>
+            <p:ph type="subTitle" idx="1"/>
+          </p:nvPr>
+        </p:nvSpPr>
+        <p:spPr/>
+        <p:txBody>
+          <a:bodyPr/>
+          <a:lstStyle/>
+          <a:p>
+            <a:r>
+              <a:rPr lang="en-US" dirty="0"/>
+              <a:t>Drawing #8</a:t>
+            </a:r>
+          </a:p>
+        </p:txBody>
+      </p:sp>
+      <p:sp>
+        <p:nvSpPr>
+          <p:cNvPr id="3" name="Footer Placeholder 2">
+            <a:extLst>
+              <a:ext uri="{FF2B5EF4-FFF2-40B4-BE49-F238E27FC236}">
+                <a16:creationId xmlns:a16="http://schemas.microsoft.com/office/drawing/2014/main" id="{1C8B0826-5E65-4731-9543-60C266E8708C}"/>
+              </a:ext>
+            </a:extLst>
+          </p:cNvPr>
+          <p:cNvSpPr>
+            <a:spLocks noGrp="1"/>
+          </p:cNvSpPr>
+          <p:nvPr>
+            <p:ph type="ftr" sz="quarter" idx="11"/>
+          </p:nvPr>
+        </p:nvSpPr>
+        <p:spPr/>
+        <p:txBody>
+          <a:bodyPr/>
+          <a:lstStyle/>
+          <a:p>
+            <a:r>
+              <a:rPr lang="en-US"/>
+              <a:t>Add a footer</a:t>
+            </a:r>
+            <a:endParaRPr lang="en-US" dirty="0"/>
+          </a:p>
+        </p:txBody>
+      </p:sp>
+    </p:spTree>
+    <p:extLst>
+      <p:ext uri="{BB962C8B-B14F-4D97-AF65-F5344CB8AC3E}">
+        <p14:creationId xmlns:p14="http://schemas.microsoft.com/office/powerpoint/2010/main" val="1416710693"/>
       </p:ext>
     </p:extLst>
   </p:cSld>

</xml_diff>

<commit_message>
Update High School/Design and Drawing for Production/Unit 4 - The Alphabet of Lines/Section 1 - Introduction to Alphabet of Lines/Assets/Unit 4 - Section 1 - Introduction to Alphabet of Line.pptx
</commit_message>
<xml_diff>
--- a/High School/Design and Drawing for Production/Unit 4 - The Alphabet of Lines/Section 1 - Introduction to Alphabet of Lines/Assets/Unit 4 - Section 1 - Introduction to Alphabet of Line.pptx
+++ b/High School/Design and Drawing for Production/Unit 4 - The Alphabet of Lines/Section 1 - Introduction to Alphabet of Lines/Assets/Unit 4 - Section 1 - Introduction to Alphabet of Line.pptx
@@ -5,10 +5,10 @@
     <p:sldMasterId id="2147483735" r:id="rId1"/>
   </p:sldMasterIdLst>
   <p:notesMasterIdLst>
-    <p:notesMasterId r:id="rId30"/>
+    <p:notesMasterId r:id="rId33"/>
   </p:notesMasterIdLst>
   <p:handoutMasterIdLst>
-    <p:handoutMasterId r:id="rId31"/>
+    <p:handoutMasterId r:id="rId34"/>
   </p:handoutMasterIdLst>
   <p:sldIdLst>
     <p:sldId id="268" r:id="rId2"/>
@@ -39,6 +39,9 @@
     <p:sldId id="294" r:id="rId27"/>
     <p:sldId id="296" r:id="rId28"/>
     <p:sldId id="297" r:id="rId29"/>
+    <p:sldId id="298" r:id="rId30"/>
+    <p:sldId id="299" r:id="rId31"/>
+    <p:sldId id="300" r:id="rId32"/>
   </p:sldIdLst>
   <p:sldSz cx="12192000" cy="6858000"/>
   <p:notesSz cx="6858000" cy="9144000"/>
@@ -241,7 +244,7 @@
           <a:p>
             <a:fld id="{6AC4FB8F-ED15-48AB-97BD-17129D4E699D}" type="datetimeFigureOut">
               <a:rPr lang="en-US" smtClean="0"/>
-              <a:t>10/17/2018</a:t>
+              <a:t>10/18/2018</a:t>
             </a:fld>
             <a:endParaRPr lang="en-US" dirty="0"/>
           </a:p>
@@ -406,7 +409,7 @@
           <a:p>
             <a:fld id="{BBC9D437-CD83-4825-AD0D-5E7B341BC79B}" type="datetimeFigureOut">
               <a:rPr lang="en-US" smtClean="0"/>
-              <a:t>10/17/2018</a:t>
+              <a:t>10/18/2018</a:t>
             </a:fld>
             <a:endParaRPr lang="en-US" dirty="0"/>
           </a:p>
@@ -864,7 +867,7 @@
           <a:p>
             <a:fld id="{85AB7CBB-843F-464A-A764-71D6ADC27CFA}" type="datetime1">
               <a:rPr lang="en-US" smtClean="0"/>
-              <a:t>10/17/2018</a:t>
+              <a:t>10/18/2018</a:t>
             </a:fld>
             <a:endParaRPr lang="en-US" dirty="0"/>
           </a:p>
@@ -1317,7 +1320,7 @@
           <a:p>
             <a:fld id="{3F138946-C5C1-4A11-BA69-F12F43F8A94B}" type="datetime1">
               <a:rPr lang="en-US" smtClean="0"/>
-              <a:t>10/17/2018</a:t>
+              <a:t>10/18/2018</a:t>
             </a:fld>
             <a:endParaRPr lang="en-US" dirty="0"/>
           </a:p>
@@ -1573,7 +1576,7 @@
           <a:p>
             <a:fld id="{3F138946-C5C1-4A11-BA69-F12F43F8A94B}" type="datetime1">
               <a:rPr lang="en-US" smtClean="0"/>
-              <a:t>10/17/2018</a:t>
+              <a:t>10/18/2018</a:t>
             </a:fld>
             <a:endParaRPr lang="en-US" dirty="0"/>
           </a:p>
@@ -1887,7 +1890,7 @@
           <a:p>
             <a:fld id="{3F138946-C5C1-4A11-BA69-F12F43F8A94B}" type="datetime1">
               <a:rPr lang="en-US" smtClean="0"/>
-              <a:t>10/17/2018</a:t>
+              <a:t>10/18/2018</a:t>
             </a:fld>
             <a:endParaRPr lang="en-US" dirty="0"/>
           </a:p>
@@ -2211,7 +2214,7 @@
           <a:p>
             <a:fld id="{3F138946-C5C1-4A11-BA69-F12F43F8A94B}" type="datetime1">
               <a:rPr lang="en-US" smtClean="0"/>
-              <a:t>10/17/2018</a:t>
+              <a:t>10/18/2018</a:t>
             </a:fld>
             <a:endParaRPr lang="en-US" dirty="0"/>
           </a:p>
@@ -2519,7 +2522,7 @@
           <a:p>
             <a:fld id="{3F138946-C5C1-4A11-BA69-F12F43F8A94B}" type="datetime1">
               <a:rPr lang="en-US" smtClean="0"/>
-              <a:t>10/17/2018</a:t>
+              <a:t>10/18/2018</a:t>
             </a:fld>
             <a:endParaRPr lang="en-US" dirty="0"/>
           </a:p>
@@ -2892,7 +2895,7 @@
           <a:p>
             <a:fld id="{3F138946-C5C1-4A11-BA69-F12F43F8A94B}" type="datetime1">
               <a:rPr lang="en-US" smtClean="0"/>
-              <a:t>10/17/2018</a:t>
+              <a:t>10/18/2018</a:t>
             </a:fld>
             <a:endParaRPr lang="en-US" dirty="0"/>
           </a:p>
@@ -3072,7 +3075,7 @@
           <a:p>
             <a:fld id="{CBEFC03D-3A1F-4813-9337-02411FCC3A9A}" type="datetime1">
               <a:rPr lang="en-US" smtClean="0"/>
-              <a:t>10/17/2018</a:t>
+              <a:t>10/18/2018</a:t>
             </a:fld>
             <a:endParaRPr lang="en-US" dirty="0"/>
           </a:p>
@@ -3268,7 +3271,7 @@
           <a:p>
             <a:fld id="{3D638F79-DFA0-4C26-9553-23A017B69AB6}" type="datetime1">
               <a:rPr lang="en-US" smtClean="0"/>
-              <a:t>10/17/2018</a:t>
+              <a:t>10/18/2018</a:t>
             </a:fld>
             <a:endParaRPr lang="en-US" dirty="0"/>
           </a:p>
@@ -3379,7 +3382,7 @@
           <a:p>
             <a:fld id="{AA615CA6-EC4D-4728-8AA6-534BE7E9B67C}" type="datetime1">
               <a:rPr lang="en-US" smtClean="0"/>
-              <a:t>10/17/2018</a:t>
+              <a:t>10/18/2018</a:t>
             </a:fld>
             <a:endParaRPr lang="en-US" dirty="0"/>
           </a:p>
@@ -3564,7 +3567,7 @@
           <a:p>
             <a:fld id="{A70B34E7-E1D9-4FBF-A1A0-4009669A00BF}" type="datetime1">
               <a:rPr lang="en-US" smtClean="0"/>
-              <a:t>10/17/2018</a:t>
+              <a:t>10/18/2018</a:t>
             </a:fld>
             <a:endParaRPr lang="en-US" dirty="0"/>
           </a:p>
@@ -3831,7 +3834,7 @@
           <a:p>
             <a:fld id="{C50FD434-5945-4FAF-A8C0-DAE9905532CE}" type="datetimeFigureOut">
               <a:rPr lang="en-US" smtClean="0"/>
-              <a:t>10/17/2018</a:t>
+              <a:t>10/18/2018</a:t>
             </a:fld>
             <a:endParaRPr lang="en-US"/>
           </a:p>
@@ -4079,7 +4082,7 @@
           <a:p>
             <a:fld id="{7579E8B6-2F47-420B-83EA-EB2285D13EC9}" type="datetime1">
               <a:rPr lang="en-US" smtClean="0"/>
-              <a:t>10/17/2018</a:t>
+              <a:t>10/18/2018</a:t>
             </a:fld>
             <a:endParaRPr lang="en-US" dirty="0"/>
           </a:p>
@@ -4477,7 +4480,7 @@
           <a:p>
             <a:fld id="{2304803D-B10E-4B90-8456-A0E05393E233}" type="datetime1">
               <a:rPr lang="en-US" smtClean="0"/>
-              <a:t>10/17/2018</a:t>
+              <a:t>10/18/2018</a:t>
             </a:fld>
             <a:endParaRPr lang="en-US" dirty="0"/>
           </a:p>
@@ -4611,7 +4614,7 @@
           <a:p>
             <a:fld id="{CCE1E62F-6CCE-4064-96C2-2084AF883904}" type="datetime1">
               <a:rPr lang="en-US" smtClean="0"/>
-              <a:t>10/17/2018</a:t>
+              <a:t>10/18/2018</a:t>
             </a:fld>
             <a:endParaRPr lang="en-US" dirty="0"/>
           </a:p>
@@ -4722,7 +4725,7 @@
           <a:p>
             <a:fld id="{AA615CA6-EC4D-4728-8AA6-534BE7E9B67C}" type="datetime1">
               <a:rPr lang="en-US" smtClean="0"/>
-              <a:t>10/17/2018</a:t>
+              <a:t>10/18/2018</a:t>
             </a:fld>
             <a:endParaRPr lang="en-US" dirty="0"/>
           </a:p>
@@ -4993,7 +4996,7 @@
           <a:p>
             <a:fld id="{A6139942-0A2E-443A-842F-D6DE74360370}" type="datetime1">
               <a:rPr lang="en-US" smtClean="0"/>
-              <a:t>10/17/2018</a:t>
+              <a:t>10/18/2018</a:t>
             </a:fld>
             <a:endParaRPr lang="en-US" dirty="0"/>
           </a:p>
@@ -5292,7 +5295,7 @@
           <a:p>
             <a:fld id="{C50FD434-5945-4FAF-A8C0-DAE9905532CE}" type="datetimeFigureOut">
               <a:rPr lang="en-US" smtClean="0"/>
-              <a:t>10/17/2018</a:t>
+              <a:t>10/18/2018</a:t>
             </a:fld>
             <a:endParaRPr lang="en-US"/>
           </a:p>
@@ -5762,7 +5765,7 @@
           <a:p>
             <a:fld id="{3F138946-C5C1-4A11-BA69-F12F43F8A94B}" type="datetime1">
               <a:rPr lang="en-US" smtClean="0"/>
-              <a:t>10/17/2018</a:t>
+              <a:t>10/18/2018</a:t>
             </a:fld>
             <a:endParaRPr lang="en-US" dirty="0"/>
           </a:p>
@@ -12818,6 +12821,105 @@
 </p:sld>
 </file>
 
+<file path=ppt/slides/slide29.xml><?xml version="1.0" encoding="utf-8"?>
+<p:sld xmlns:a="http://schemas.openxmlformats.org/drawingml/2006/main" xmlns:r="http://schemas.openxmlformats.org/officeDocument/2006/relationships" xmlns:p="http://schemas.openxmlformats.org/presentationml/2006/main">
+  <p:cSld>
+    <p:spTree>
+      <p:nvGrpSpPr>
+        <p:cNvPr id="1" name=""/>
+        <p:cNvGrpSpPr/>
+        <p:nvPr/>
+      </p:nvGrpSpPr>
+      <p:grpSpPr>
+        <a:xfrm>
+          <a:off x="0" y="0"/>
+          <a:ext cx="0" cy="0"/>
+          <a:chOff x="0" y="0"/>
+          <a:chExt cx="0" cy="0"/>
+        </a:xfrm>
+      </p:grpSpPr>
+      <p:sp>
+        <p:nvSpPr>
+          <p:cNvPr id="5" name="Title 4">
+            <a:extLst>
+              <a:ext uri="{FF2B5EF4-FFF2-40B4-BE49-F238E27FC236}">
+                <a16:creationId xmlns:a16="http://schemas.microsoft.com/office/drawing/2014/main" id="{4367301C-9E62-4A97-A776-7C2F6EAEAB9B}"/>
+              </a:ext>
+            </a:extLst>
+          </p:cNvPr>
+          <p:cNvSpPr>
+            <a:spLocks noGrp="1"/>
+          </p:cNvSpPr>
+          <p:nvPr>
+            <p:ph type="title"/>
+          </p:nvPr>
+        </p:nvSpPr>
+        <p:spPr/>
+        <p:txBody>
+          <a:bodyPr/>
+          <a:lstStyle/>
+          <a:p>
+            <a:r>
+              <a:rPr lang="en-US" dirty="0"/>
+              <a:t>LP 4</a:t>
+            </a:r>
+          </a:p>
+        </p:txBody>
+      </p:sp>
+      <p:sp>
+        <p:nvSpPr>
+          <p:cNvPr id="4" name="Footer Placeholder 3">
+            <a:extLst>
+              <a:ext uri="{FF2B5EF4-FFF2-40B4-BE49-F238E27FC236}">
+                <a16:creationId xmlns:a16="http://schemas.microsoft.com/office/drawing/2014/main" id="{79004010-F763-427D-8147-B73D87274D90}"/>
+              </a:ext>
+            </a:extLst>
+          </p:cNvPr>
+          <p:cNvSpPr>
+            <a:spLocks noGrp="1"/>
+          </p:cNvSpPr>
+          <p:nvPr>
+            <p:ph type="ftr" sz="quarter" idx="11"/>
+          </p:nvPr>
+        </p:nvSpPr>
+        <p:spPr/>
+        <p:txBody>
+          <a:bodyPr/>
+          <a:lstStyle/>
+          <a:p>
+            <a:r>
+              <a:rPr lang="en-US"/>
+              <a:t>Add a footer</a:t>
+            </a:r>
+            <a:endParaRPr lang="en-US" dirty="0"/>
+          </a:p>
+        </p:txBody>
+      </p:sp>
+    </p:spTree>
+    <p:extLst>
+      <p:ext uri="{BB962C8B-B14F-4D97-AF65-F5344CB8AC3E}">
+        <p14:creationId xmlns:p14="http://schemas.microsoft.com/office/powerpoint/2010/main" val="1091710875"/>
+      </p:ext>
+    </p:extLst>
+  </p:cSld>
+  <p:clrMapOvr>
+    <a:masterClrMapping/>
+  </p:clrMapOvr>
+  <mc:AlternateContent xmlns:mc="http://schemas.openxmlformats.org/markup-compatibility/2006" xmlns:p14="http://schemas.microsoft.com/office/powerpoint/2010/main">
+    <mc:Choice Requires="p14">
+      <p:transition spd="med" p14:dur="700">
+        <p:fade/>
+      </p:transition>
+    </mc:Choice>
+    <mc:Fallback xmlns="">
+      <p:transition spd="med">
+        <p:fade/>
+      </p:transition>
+    </mc:Fallback>
+  </mc:AlternateContent>
+</p:sld>
+</file>
+
 <file path=ppt/slides/slide3.xml><?xml version="1.0" encoding="utf-8"?>
 <p:sld xmlns:a="http://schemas.openxmlformats.org/drawingml/2006/main" xmlns:r="http://schemas.openxmlformats.org/officeDocument/2006/relationships" xmlns:p="http://schemas.openxmlformats.org/presentationml/2006/main">
   <p:cSld>
@@ -12949,6 +13051,296 @@
     <p:extLst>
       <p:ext uri="{BB962C8B-B14F-4D97-AF65-F5344CB8AC3E}">
         <p14:creationId xmlns:p14="http://schemas.microsoft.com/office/powerpoint/2010/main" val="2763204688"/>
+      </p:ext>
+    </p:extLst>
+  </p:cSld>
+  <p:clrMapOvr>
+    <a:masterClrMapping/>
+  </p:clrMapOvr>
+  <mc:AlternateContent xmlns:mc="http://schemas.openxmlformats.org/markup-compatibility/2006" xmlns:p14="http://schemas.microsoft.com/office/powerpoint/2010/main">
+    <mc:Choice Requires="p14">
+      <p:transition spd="med" p14:dur="700">
+        <p:fade/>
+      </p:transition>
+    </mc:Choice>
+    <mc:Fallback xmlns="">
+      <p:transition spd="med">
+        <p:fade/>
+      </p:transition>
+    </mc:Fallback>
+  </mc:AlternateContent>
+</p:sld>
+</file>
+
+<file path=ppt/slides/slide30.xml><?xml version="1.0" encoding="utf-8"?>
+<p:sld xmlns:a="http://schemas.openxmlformats.org/drawingml/2006/main" xmlns:r="http://schemas.openxmlformats.org/officeDocument/2006/relationships" xmlns:p="http://schemas.openxmlformats.org/presentationml/2006/main">
+  <p:cSld>
+    <p:spTree>
+      <p:nvGrpSpPr>
+        <p:cNvPr id="1" name=""/>
+        <p:cNvGrpSpPr/>
+        <p:nvPr/>
+      </p:nvGrpSpPr>
+      <p:grpSpPr>
+        <a:xfrm>
+          <a:off x="0" y="0"/>
+          <a:ext cx="0" cy="0"/>
+          <a:chOff x="0" y="0"/>
+          <a:chExt cx="0" cy="0"/>
+        </a:xfrm>
+      </p:grpSpPr>
+      <p:sp>
+        <p:nvSpPr>
+          <p:cNvPr id="4" name="Title 3">
+            <a:extLst>
+              <a:ext uri="{FF2B5EF4-FFF2-40B4-BE49-F238E27FC236}">
+                <a16:creationId xmlns:a16="http://schemas.microsoft.com/office/drawing/2014/main" id="{C261C424-AA7E-4C83-A265-373D787780AF}"/>
+              </a:ext>
+            </a:extLst>
+          </p:cNvPr>
+          <p:cNvSpPr>
+            <a:spLocks noGrp="1"/>
+          </p:cNvSpPr>
+          <p:nvPr>
+            <p:ph type="title"/>
+          </p:nvPr>
+        </p:nvSpPr>
+        <p:spPr/>
+        <p:txBody>
+          <a:bodyPr/>
+          <a:lstStyle/>
+          <a:p>
+            <a:r>
+              <a:rPr lang="en-US" dirty="0"/>
+              <a:t>Drafting neatness</a:t>
+            </a:r>
+          </a:p>
+        </p:txBody>
+      </p:sp>
+      <p:sp>
+        <p:nvSpPr>
+          <p:cNvPr id="5" name="Content Placeholder 4">
+            <a:extLst>
+              <a:ext uri="{FF2B5EF4-FFF2-40B4-BE49-F238E27FC236}">
+                <a16:creationId xmlns:a16="http://schemas.microsoft.com/office/drawing/2014/main" id="{5FB15BB9-DF65-4384-92F0-41EA410C768D}"/>
+              </a:ext>
+            </a:extLst>
+          </p:cNvPr>
+          <p:cNvSpPr>
+            <a:spLocks noGrp="1"/>
+          </p:cNvSpPr>
+          <p:nvPr>
+            <p:ph idx="1"/>
+          </p:nvPr>
+        </p:nvSpPr>
+        <p:spPr/>
+        <p:txBody>
+          <a:bodyPr/>
+          <a:lstStyle/>
+          <a:p>
+            <a:r>
+              <a:rPr lang="en-US" dirty="0"/>
+              <a:t>Use your erasing shield as often as possible</a:t>
+            </a:r>
+          </a:p>
+          <a:p>
+            <a:r>
+              <a:rPr lang="en-US" dirty="0"/>
+              <a:t>Try and wash hands before starting to draw</a:t>
+            </a:r>
+          </a:p>
+          <a:p>
+            <a:r>
+              <a:rPr lang="en-US" dirty="0"/>
+              <a:t>Always wipe dust and dirt from your instruments</a:t>
+            </a:r>
+          </a:p>
+          <a:p>
+            <a:r>
+              <a:rPr lang="en-US" dirty="0"/>
+              <a:t>Lay out all views with construction lines then ‘heavy-in’</a:t>
+            </a:r>
+          </a:p>
+          <a:p>
+            <a:r>
+              <a:rPr lang="en-US" dirty="0"/>
+              <a:t>Remove dust or eraser pieces as soon as possible</a:t>
+            </a:r>
+          </a:p>
+          <a:p>
+            <a:r>
+              <a:rPr lang="en-US" dirty="0"/>
+              <a:t>Don’t slide instruments, try and lift and put down</a:t>
+            </a:r>
+          </a:p>
+          <a:p>
+            <a:r>
+              <a:rPr lang="en-US" sz="2800" b="1" dirty="0"/>
+              <a:t>Keep an organized orderly drafting area</a:t>
+            </a:r>
+          </a:p>
+        </p:txBody>
+      </p:sp>
+      <p:sp>
+        <p:nvSpPr>
+          <p:cNvPr id="3" name="Footer Placeholder 2">
+            <a:extLst>
+              <a:ext uri="{FF2B5EF4-FFF2-40B4-BE49-F238E27FC236}">
+                <a16:creationId xmlns:a16="http://schemas.microsoft.com/office/drawing/2014/main" id="{D03FB568-79CA-4314-A86F-F38E112F7BC8}"/>
+              </a:ext>
+            </a:extLst>
+          </p:cNvPr>
+          <p:cNvSpPr>
+            <a:spLocks noGrp="1"/>
+          </p:cNvSpPr>
+          <p:nvPr>
+            <p:ph type="ftr" sz="quarter" idx="11"/>
+          </p:nvPr>
+        </p:nvSpPr>
+        <p:spPr/>
+        <p:txBody>
+          <a:bodyPr/>
+          <a:lstStyle/>
+          <a:p>
+            <a:r>
+              <a:rPr lang="en-US"/>
+              <a:t>Add a footer</a:t>
+            </a:r>
+            <a:endParaRPr lang="en-US" dirty="0"/>
+          </a:p>
+        </p:txBody>
+      </p:sp>
+    </p:spTree>
+    <p:extLst>
+      <p:ext uri="{BB962C8B-B14F-4D97-AF65-F5344CB8AC3E}">
+        <p14:creationId xmlns:p14="http://schemas.microsoft.com/office/powerpoint/2010/main" val="185260185"/>
+      </p:ext>
+    </p:extLst>
+  </p:cSld>
+  <p:clrMapOvr>
+    <a:masterClrMapping/>
+  </p:clrMapOvr>
+  <mc:AlternateContent xmlns:mc="http://schemas.openxmlformats.org/markup-compatibility/2006" xmlns:p14="http://schemas.microsoft.com/office/powerpoint/2010/main">
+    <mc:Choice Requires="p14">
+      <p:transition spd="med" p14:dur="700">
+        <p:fade/>
+      </p:transition>
+    </mc:Choice>
+    <mc:Fallback xmlns="">
+      <p:transition spd="med">
+        <p:fade/>
+      </p:transition>
+    </mc:Fallback>
+  </mc:AlternateContent>
+</p:sld>
+</file>
+
+<file path=ppt/slides/slide31.xml><?xml version="1.0" encoding="utf-8"?>
+<p:sld xmlns:a="http://schemas.openxmlformats.org/drawingml/2006/main" xmlns:r="http://schemas.openxmlformats.org/officeDocument/2006/relationships" xmlns:p="http://schemas.openxmlformats.org/presentationml/2006/main">
+  <p:cSld>
+    <p:spTree>
+      <p:nvGrpSpPr>
+        <p:cNvPr id="1" name=""/>
+        <p:cNvGrpSpPr/>
+        <p:nvPr/>
+      </p:nvGrpSpPr>
+      <p:grpSpPr>
+        <a:xfrm>
+          <a:off x="0" y="0"/>
+          <a:ext cx="0" cy="0"/>
+          <a:chOff x="0" y="0"/>
+          <a:chExt cx="0" cy="0"/>
+        </a:xfrm>
+      </p:grpSpPr>
+      <p:sp>
+        <p:nvSpPr>
+          <p:cNvPr id="4" name="Title 3">
+            <a:extLst>
+              <a:ext uri="{FF2B5EF4-FFF2-40B4-BE49-F238E27FC236}">
+                <a16:creationId xmlns:a16="http://schemas.microsoft.com/office/drawing/2014/main" id="{07506127-40F4-46B4-AA13-9926B2BD096B}"/>
+              </a:ext>
+            </a:extLst>
+          </p:cNvPr>
+          <p:cNvSpPr>
+            <a:spLocks noGrp="1"/>
+          </p:cNvSpPr>
+          <p:nvPr>
+            <p:ph type="ctrTitle"/>
+          </p:nvPr>
+        </p:nvSpPr>
+        <p:spPr/>
+        <p:txBody>
+          <a:bodyPr/>
+          <a:lstStyle/>
+          <a:p>
+            <a:r>
+              <a:rPr lang="en-US" dirty="0"/>
+              <a:t>Alphabet of Lines</a:t>
+            </a:r>
+          </a:p>
+        </p:txBody>
+      </p:sp>
+      <p:sp>
+        <p:nvSpPr>
+          <p:cNvPr id="5" name="Subtitle 4">
+            <a:extLst>
+              <a:ext uri="{FF2B5EF4-FFF2-40B4-BE49-F238E27FC236}">
+                <a16:creationId xmlns:a16="http://schemas.microsoft.com/office/drawing/2014/main" id="{BBBCF47C-CE96-46DF-9B20-6EF8EEE99D3F}"/>
+              </a:ext>
+            </a:extLst>
+          </p:cNvPr>
+          <p:cNvSpPr>
+            <a:spLocks noGrp="1"/>
+          </p:cNvSpPr>
+          <p:nvPr>
+            <p:ph type="subTitle" idx="1"/>
+          </p:nvPr>
+        </p:nvSpPr>
+        <p:spPr/>
+        <p:txBody>
+          <a:bodyPr/>
+          <a:lstStyle/>
+          <a:p>
+            <a:r>
+              <a:rPr lang="en-US" dirty="0"/>
+              <a:t>Drawing #8</a:t>
+            </a:r>
+          </a:p>
+        </p:txBody>
+      </p:sp>
+      <p:sp>
+        <p:nvSpPr>
+          <p:cNvPr id="3" name="Footer Placeholder 2">
+            <a:extLst>
+              <a:ext uri="{FF2B5EF4-FFF2-40B4-BE49-F238E27FC236}">
+                <a16:creationId xmlns:a16="http://schemas.microsoft.com/office/drawing/2014/main" id="{1C8B0826-5E65-4731-9543-60C266E8708C}"/>
+              </a:ext>
+            </a:extLst>
+          </p:cNvPr>
+          <p:cNvSpPr>
+            <a:spLocks noGrp="1"/>
+          </p:cNvSpPr>
+          <p:nvPr>
+            <p:ph type="ftr" sz="quarter" idx="11"/>
+          </p:nvPr>
+        </p:nvSpPr>
+        <p:spPr/>
+        <p:txBody>
+          <a:bodyPr/>
+          <a:lstStyle/>
+          <a:p>
+            <a:r>
+              <a:rPr lang="en-US"/>
+              <a:t>Add a footer</a:t>
+            </a:r>
+            <a:endParaRPr lang="en-US" dirty="0"/>
+          </a:p>
+        </p:txBody>
+      </p:sp>
+    </p:spTree>
+    <p:extLst>
+      <p:ext uri="{BB962C8B-B14F-4D97-AF65-F5344CB8AC3E}">
+        <p14:creationId xmlns:p14="http://schemas.microsoft.com/office/powerpoint/2010/main" val="1204286146"/>
       </p:ext>
     </p:extLst>
   </p:cSld>

</xml_diff>

<commit_message>
Updated DDP and EE assets
</commit_message>
<xml_diff>
--- a/High School/Design and Drawing for Production/Unit 4 - The Alphabet of Lines/Section 1 - Introduction to Alphabet of Lines/Assets/Unit 4 - Section 1 - Introduction to Alphabet of Line.pptx
+++ b/High School/Design and Drawing for Production/Unit 4 - The Alphabet of Lines/Section 1 - Introduction to Alphabet of Lines/Assets/Unit 4 - Section 1 - Introduction to Alphabet of Line.pptx
@@ -5,10 +5,10 @@
     <p:sldMasterId id="2147483735" r:id="rId1"/>
   </p:sldMasterIdLst>
   <p:notesMasterIdLst>
-    <p:notesMasterId r:id="rId33"/>
+    <p:notesMasterId r:id="rId35"/>
   </p:notesMasterIdLst>
   <p:handoutMasterIdLst>
-    <p:handoutMasterId r:id="rId34"/>
+    <p:handoutMasterId r:id="rId36"/>
   </p:handoutMasterIdLst>
   <p:sldIdLst>
     <p:sldId id="268" r:id="rId2"/>
@@ -40,8 +40,10 @@
     <p:sldId id="296" r:id="rId28"/>
     <p:sldId id="297" r:id="rId29"/>
     <p:sldId id="298" r:id="rId30"/>
-    <p:sldId id="299" r:id="rId31"/>
-    <p:sldId id="300" r:id="rId32"/>
+    <p:sldId id="301" r:id="rId31"/>
+    <p:sldId id="302" r:id="rId32"/>
+    <p:sldId id="299" r:id="rId33"/>
+    <p:sldId id="300" r:id="rId34"/>
   </p:sldIdLst>
   <p:sldSz cx="12192000" cy="6858000"/>
   <p:notesSz cx="6858000" cy="9144000"/>
@@ -244,7 +246,7 @@
           <a:p>
             <a:fld id="{6AC4FB8F-ED15-48AB-97BD-17129D4E699D}" type="datetimeFigureOut">
               <a:rPr lang="en-US" smtClean="0"/>
-              <a:t>10/18/2018</a:t>
+              <a:t>10/19/2018</a:t>
             </a:fld>
             <a:endParaRPr lang="en-US" dirty="0"/>
           </a:p>
@@ -409,7 +411,7 @@
           <a:p>
             <a:fld id="{BBC9D437-CD83-4825-AD0D-5E7B341BC79B}" type="datetimeFigureOut">
               <a:rPr lang="en-US" smtClean="0"/>
-              <a:t>10/18/2018</a:t>
+              <a:t>10/19/2018</a:t>
             </a:fld>
             <a:endParaRPr lang="en-US" dirty="0"/>
           </a:p>
@@ -867,7 +869,7 @@
           <a:p>
             <a:fld id="{85AB7CBB-843F-464A-A764-71D6ADC27CFA}" type="datetime1">
               <a:rPr lang="en-US" smtClean="0"/>
-              <a:t>10/18/2018</a:t>
+              <a:t>10/19/2018</a:t>
             </a:fld>
             <a:endParaRPr lang="en-US" dirty="0"/>
           </a:p>
@@ -1320,7 +1322,7 @@
           <a:p>
             <a:fld id="{3F138946-C5C1-4A11-BA69-F12F43F8A94B}" type="datetime1">
               <a:rPr lang="en-US" smtClean="0"/>
-              <a:t>10/18/2018</a:t>
+              <a:t>10/19/2018</a:t>
             </a:fld>
             <a:endParaRPr lang="en-US" dirty="0"/>
           </a:p>
@@ -1576,7 +1578,7 @@
           <a:p>
             <a:fld id="{3F138946-C5C1-4A11-BA69-F12F43F8A94B}" type="datetime1">
               <a:rPr lang="en-US" smtClean="0"/>
-              <a:t>10/18/2018</a:t>
+              <a:t>10/19/2018</a:t>
             </a:fld>
             <a:endParaRPr lang="en-US" dirty="0"/>
           </a:p>
@@ -1890,7 +1892,7 @@
           <a:p>
             <a:fld id="{3F138946-C5C1-4A11-BA69-F12F43F8A94B}" type="datetime1">
               <a:rPr lang="en-US" smtClean="0"/>
-              <a:t>10/18/2018</a:t>
+              <a:t>10/19/2018</a:t>
             </a:fld>
             <a:endParaRPr lang="en-US" dirty="0"/>
           </a:p>
@@ -2214,7 +2216,7 @@
           <a:p>
             <a:fld id="{3F138946-C5C1-4A11-BA69-F12F43F8A94B}" type="datetime1">
               <a:rPr lang="en-US" smtClean="0"/>
-              <a:t>10/18/2018</a:t>
+              <a:t>10/19/2018</a:t>
             </a:fld>
             <a:endParaRPr lang="en-US" dirty="0"/>
           </a:p>
@@ -2522,7 +2524,7 @@
           <a:p>
             <a:fld id="{3F138946-C5C1-4A11-BA69-F12F43F8A94B}" type="datetime1">
               <a:rPr lang="en-US" smtClean="0"/>
-              <a:t>10/18/2018</a:t>
+              <a:t>10/19/2018</a:t>
             </a:fld>
             <a:endParaRPr lang="en-US" dirty="0"/>
           </a:p>
@@ -2895,7 +2897,7 @@
           <a:p>
             <a:fld id="{3F138946-C5C1-4A11-BA69-F12F43F8A94B}" type="datetime1">
               <a:rPr lang="en-US" smtClean="0"/>
-              <a:t>10/18/2018</a:t>
+              <a:t>10/19/2018</a:t>
             </a:fld>
             <a:endParaRPr lang="en-US" dirty="0"/>
           </a:p>
@@ -3075,7 +3077,7 @@
           <a:p>
             <a:fld id="{CBEFC03D-3A1F-4813-9337-02411FCC3A9A}" type="datetime1">
               <a:rPr lang="en-US" smtClean="0"/>
-              <a:t>10/18/2018</a:t>
+              <a:t>10/19/2018</a:t>
             </a:fld>
             <a:endParaRPr lang="en-US" dirty="0"/>
           </a:p>
@@ -3271,7 +3273,7 @@
           <a:p>
             <a:fld id="{3D638F79-DFA0-4C26-9553-23A017B69AB6}" type="datetime1">
               <a:rPr lang="en-US" smtClean="0"/>
-              <a:t>10/18/2018</a:t>
+              <a:t>10/19/2018</a:t>
             </a:fld>
             <a:endParaRPr lang="en-US" dirty="0"/>
           </a:p>
@@ -3382,7 +3384,7 @@
           <a:p>
             <a:fld id="{AA615CA6-EC4D-4728-8AA6-534BE7E9B67C}" type="datetime1">
               <a:rPr lang="en-US" smtClean="0"/>
-              <a:t>10/18/2018</a:t>
+              <a:t>10/19/2018</a:t>
             </a:fld>
             <a:endParaRPr lang="en-US" dirty="0"/>
           </a:p>
@@ -3567,7 +3569,7 @@
           <a:p>
             <a:fld id="{A70B34E7-E1D9-4FBF-A1A0-4009669A00BF}" type="datetime1">
               <a:rPr lang="en-US" smtClean="0"/>
-              <a:t>10/18/2018</a:t>
+              <a:t>10/19/2018</a:t>
             </a:fld>
             <a:endParaRPr lang="en-US" dirty="0"/>
           </a:p>
@@ -3834,7 +3836,7 @@
           <a:p>
             <a:fld id="{C50FD434-5945-4FAF-A8C0-DAE9905532CE}" type="datetimeFigureOut">
               <a:rPr lang="en-US" smtClean="0"/>
-              <a:t>10/18/2018</a:t>
+              <a:t>10/19/2018</a:t>
             </a:fld>
             <a:endParaRPr lang="en-US"/>
           </a:p>
@@ -4082,7 +4084,7 @@
           <a:p>
             <a:fld id="{7579E8B6-2F47-420B-83EA-EB2285D13EC9}" type="datetime1">
               <a:rPr lang="en-US" smtClean="0"/>
-              <a:t>10/18/2018</a:t>
+              <a:t>10/19/2018</a:t>
             </a:fld>
             <a:endParaRPr lang="en-US" dirty="0"/>
           </a:p>
@@ -4480,7 +4482,7 @@
           <a:p>
             <a:fld id="{2304803D-B10E-4B90-8456-A0E05393E233}" type="datetime1">
               <a:rPr lang="en-US" smtClean="0"/>
-              <a:t>10/18/2018</a:t>
+              <a:t>10/19/2018</a:t>
             </a:fld>
             <a:endParaRPr lang="en-US" dirty="0"/>
           </a:p>
@@ -4614,7 +4616,7 @@
           <a:p>
             <a:fld id="{CCE1E62F-6CCE-4064-96C2-2084AF883904}" type="datetime1">
               <a:rPr lang="en-US" smtClean="0"/>
-              <a:t>10/18/2018</a:t>
+              <a:t>10/19/2018</a:t>
             </a:fld>
             <a:endParaRPr lang="en-US" dirty="0"/>
           </a:p>
@@ -4725,7 +4727,7 @@
           <a:p>
             <a:fld id="{AA615CA6-EC4D-4728-8AA6-534BE7E9B67C}" type="datetime1">
               <a:rPr lang="en-US" smtClean="0"/>
-              <a:t>10/18/2018</a:t>
+              <a:t>10/19/2018</a:t>
             </a:fld>
             <a:endParaRPr lang="en-US" dirty="0"/>
           </a:p>
@@ -4996,7 +4998,7 @@
           <a:p>
             <a:fld id="{A6139942-0A2E-443A-842F-D6DE74360370}" type="datetime1">
               <a:rPr lang="en-US" smtClean="0"/>
-              <a:t>10/18/2018</a:t>
+              <a:t>10/19/2018</a:t>
             </a:fld>
             <a:endParaRPr lang="en-US" dirty="0"/>
           </a:p>
@@ -5295,7 +5297,7 @@
           <a:p>
             <a:fld id="{C50FD434-5945-4FAF-A8C0-DAE9905532CE}" type="datetimeFigureOut">
               <a:rPr lang="en-US" smtClean="0"/>
-              <a:t>10/18/2018</a:t>
+              <a:t>10/19/2018</a:t>
             </a:fld>
             <a:endParaRPr lang="en-US"/>
           </a:p>
@@ -5765,7 +5767,7 @@
           <a:p>
             <a:fld id="{3F138946-C5C1-4A11-BA69-F12F43F8A94B}" type="datetime1">
               <a:rPr lang="en-US" smtClean="0"/>
-              <a:t>10/18/2018</a:t>
+              <a:t>10/19/2018</a:t>
             </a:fld>
             <a:endParaRPr lang="en-US" dirty="0"/>
           </a:p>
@@ -12861,7 +12863,7 @@
           <a:p>
             <a:r>
               <a:rPr lang="en-US" dirty="0"/>
-              <a:t>LP 4</a:t>
+              <a:t>LP 5</a:t>
             </a:r>
           </a:p>
         </p:txBody>
@@ -13094,6 +13096,308 @@
           <p:cNvPr id="4" name="Title 3">
             <a:extLst>
               <a:ext uri="{FF2B5EF4-FFF2-40B4-BE49-F238E27FC236}">
+                <a16:creationId xmlns:a16="http://schemas.microsoft.com/office/drawing/2014/main" id="{07506127-40F4-46B4-AA13-9926B2BD096B}"/>
+              </a:ext>
+            </a:extLst>
+          </p:cNvPr>
+          <p:cNvSpPr>
+            <a:spLocks noGrp="1"/>
+          </p:cNvSpPr>
+          <p:nvPr>
+            <p:ph type="ctrTitle"/>
+          </p:nvPr>
+        </p:nvSpPr>
+        <p:spPr/>
+        <p:txBody>
+          <a:bodyPr/>
+          <a:lstStyle/>
+          <a:p>
+            <a:r>
+              <a:rPr lang="en-US" dirty="0"/>
+              <a:t>Unit 4 Alphabet of Lines</a:t>
+            </a:r>
+          </a:p>
+        </p:txBody>
+      </p:sp>
+      <p:sp>
+        <p:nvSpPr>
+          <p:cNvPr id="5" name="Subtitle 4">
+            <a:extLst>
+              <a:ext uri="{FF2B5EF4-FFF2-40B4-BE49-F238E27FC236}">
+                <a16:creationId xmlns:a16="http://schemas.microsoft.com/office/drawing/2014/main" id="{BBBCF47C-CE96-46DF-9B20-6EF8EEE99D3F}"/>
+              </a:ext>
+            </a:extLst>
+          </p:cNvPr>
+          <p:cNvSpPr>
+            <a:spLocks noGrp="1"/>
+          </p:cNvSpPr>
+          <p:nvPr>
+            <p:ph type="subTitle" idx="1"/>
+          </p:nvPr>
+        </p:nvSpPr>
+        <p:spPr/>
+        <p:txBody>
+          <a:bodyPr/>
+          <a:lstStyle/>
+          <a:p>
+            <a:endParaRPr lang="en-US" dirty="0"/>
+          </a:p>
+        </p:txBody>
+      </p:sp>
+      <p:sp>
+        <p:nvSpPr>
+          <p:cNvPr id="3" name="Footer Placeholder 2">
+            <a:extLst>
+              <a:ext uri="{FF2B5EF4-FFF2-40B4-BE49-F238E27FC236}">
+                <a16:creationId xmlns:a16="http://schemas.microsoft.com/office/drawing/2014/main" id="{1C8B0826-5E65-4731-9543-60C266E8708C}"/>
+              </a:ext>
+            </a:extLst>
+          </p:cNvPr>
+          <p:cNvSpPr>
+            <a:spLocks noGrp="1"/>
+          </p:cNvSpPr>
+          <p:nvPr>
+            <p:ph type="ftr" sz="quarter" idx="11"/>
+          </p:nvPr>
+        </p:nvSpPr>
+        <p:spPr/>
+        <p:txBody>
+          <a:bodyPr/>
+          <a:lstStyle/>
+          <a:p>
+            <a:r>
+              <a:rPr lang="en-US"/>
+              <a:t>Add a footer</a:t>
+            </a:r>
+            <a:endParaRPr lang="en-US" dirty="0"/>
+          </a:p>
+        </p:txBody>
+      </p:sp>
+    </p:spTree>
+    <p:extLst>
+      <p:ext uri="{BB962C8B-B14F-4D97-AF65-F5344CB8AC3E}">
+        <p14:creationId xmlns:p14="http://schemas.microsoft.com/office/powerpoint/2010/main" val="4148143906"/>
+      </p:ext>
+    </p:extLst>
+  </p:cSld>
+  <p:clrMapOvr>
+    <a:masterClrMapping/>
+  </p:clrMapOvr>
+  <mc:AlternateContent xmlns:mc="http://schemas.openxmlformats.org/markup-compatibility/2006" xmlns:p14="http://schemas.microsoft.com/office/powerpoint/2010/main">
+    <mc:Choice Requires="p14">
+      <p:transition spd="med" p14:dur="700">
+        <p:fade/>
+      </p:transition>
+    </mc:Choice>
+    <mc:Fallback xmlns="">
+      <p:transition spd="med">
+        <p:fade/>
+      </p:transition>
+    </mc:Fallback>
+  </mc:AlternateContent>
+</p:sld>
+</file>
+
+<file path=ppt/slides/slide31.xml><?xml version="1.0" encoding="utf-8"?>
+<p:sld xmlns:a="http://schemas.openxmlformats.org/drawingml/2006/main" xmlns:r="http://schemas.openxmlformats.org/officeDocument/2006/relationships" xmlns:p="http://schemas.openxmlformats.org/presentationml/2006/main">
+  <p:cSld>
+    <p:bg>
+      <p:bgPr>
+        <a:gradFill rotWithShape="1">
+          <a:gsLst>
+            <a:gs pos="10000">
+              <a:schemeClr val="bg2">
+                <a:tint val="97000"/>
+                <a:hueMod val="92000"/>
+                <a:satMod val="169000"/>
+                <a:lumMod val="164000"/>
+              </a:schemeClr>
+            </a:gs>
+            <a:gs pos="100000">
+              <a:schemeClr val="bg2">
+                <a:shade val="96000"/>
+                <a:satMod val="120000"/>
+                <a:lumMod val="90000"/>
+              </a:schemeClr>
+            </a:gs>
+          </a:gsLst>
+          <a:lin ang="6120000" scaled="1"/>
+        </a:gradFill>
+        <a:effectLst/>
+      </p:bgPr>
+    </p:bg>
+    <p:spTree>
+      <p:nvGrpSpPr>
+        <p:cNvPr id="1" name=""/>
+        <p:cNvGrpSpPr/>
+        <p:nvPr/>
+      </p:nvGrpSpPr>
+      <p:grpSpPr>
+        <a:xfrm>
+          <a:off x="0" y="0"/>
+          <a:ext cx="0" cy="0"/>
+          <a:chOff x="0" y="0"/>
+          <a:chExt cx="0" cy="0"/>
+        </a:xfrm>
+      </p:grpSpPr>
+      <p:sp>
+        <p:nvSpPr>
+          <p:cNvPr id="2" name="Title 1"/>
+          <p:cNvSpPr>
+            <a:spLocks noGrp="1"/>
+          </p:cNvSpPr>
+          <p:nvPr>
+            <p:ph type="title"/>
+          </p:nvPr>
+        </p:nvSpPr>
+        <p:spPr>
+          <a:xfrm>
+            <a:off x="684213" y="639762"/>
+            <a:ext cx="4781147" cy="5574771"/>
+          </a:xfrm>
+        </p:spPr>
+        <p:txBody>
+          <a:bodyPr vert="horz" lIns="91440" tIns="45720" rIns="91440" bIns="45720" rtlCol="0" anchor="ctr">
+            <a:normAutofit/>
+          </a:bodyPr>
+          <a:lstStyle/>
+          <a:p>
+            <a:pPr algn="r"/>
+            <a:r>
+              <a:rPr lang="en-US" sz="5200"/>
+              <a:t>Google classroom code</a:t>
+            </a:r>
+          </a:p>
+        </p:txBody>
+      </p:sp>
+      <p:sp>
+        <p:nvSpPr>
+          <p:cNvPr id="3" name="Content Placeholder 2"/>
+          <p:cNvSpPr>
+            <a:spLocks noGrp="1"/>
+          </p:cNvSpPr>
+          <p:nvPr>
+            <p:ph idx="1"/>
+          </p:nvPr>
+        </p:nvSpPr>
+        <p:spPr>
+          <a:xfrm>
+            <a:off x="6491625" y="685799"/>
+            <a:ext cx="4816572" cy="4869981"/>
+          </a:xfrm>
+        </p:spPr>
+        <p:txBody>
+          <a:bodyPr vert="horz" lIns="91440" tIns="45720" rIns="91440" bIns="45720" rtlCol="0" anchor="ctr">
+            <a:normAutofit/>
+          </a:bodyPr>
+          <a:lstStyle/>
+          <a:p>
+            <a:pPr marL="0" indent="0">
+              <a:buNone/>
+            </a:pPr>
+            <a:r>
+              <a:rPr lang="en-US" sz="4000" b="1">
+                <a:solidFill>
+                  <a:schemeClr val="tx2"/>
+                </a:solidFill>
+              </a:rPr>
+              <a:t>okia9n</a:t>
+            </a:r>
+          </a:p>
+        </p:txBody>
+      </p:sp>
+      <p:sp>
+        <p:nvSpPr>
+          <p:cNvPr id="4" name="Footer Placeholder 3">
+            <a:extLst>
+              <a:ext uri="{FF2B5EF4-FFF2-40B4-BE49-F238E27FC236}">
+                <a16:creationId xmlns:a16="http://schemas.microsoft.com/office/drawing/2014/main" id="{EADFB87E-2A3F-4815-8F5E-3CF3521EBF24}"/>
+              </a:ext>
+            </a:extLst>
+          </p:cNvPr>
+          <p:cNvSpPr>
+            <a:spLocks noGrp="1"/>
+          </p:cNvSpPr>
+          <p:nvPr>
+            <p:ph type="ftr" sz="quarter" idx="11"/>
+          </p:nvPr>
+        </p:nvSpPr>
+        <p:spPr/>
+        <p:txBody>
+          <a:bodyPr vert="horz" lIns="91440" tIns="45720" rIns="91440" bIns="45720" rtlCol="0" anchor="t">
+            <a:normAutofit/>
+          </a:bodyPr>
+          <a:lstStyle/>
+          <a:p>
+            <a:pPr>
+              <a:spcAft>
+                <a:spcPts val="600"/>
+              </a:spcAft>
+            </a:pPr>
+            <a:r>
+              <a:rPr lang="en-US" b="0" i="0" kern="1200">
+                <a:solidFill>
+                  <a:schemeClr val="tx1">
+                    <a:alpha val="60000"/>
+                  </a:schemeClr>
+                </a:solidFill>
+                <a:effectLst/>
+                <a:latin typeface="+mn-lt"/>
+                <a:ea typeface="+mn-ea"/>
+                <a:cs typeface="+mn-cs"/>
+              </a:rPr>
+              <a:t>Unit 1 – Section 1 - Day 1</a:t>
+            </a:r>
+          </a:p>
+        </p:txBody>
+      </p:sp>
+    </p:spTree>
+    <p:extLst>
+      <p:ext uri="{BB962C8B-B14F-4D97-AF65-F5344CB8AC3E}">
+        <p14:creationId xmlns:p14="http://schemas.microsoft.com/office/powerpoint/2010/main" val="2539566710"/>
+      </p:ext>
+    </p:extLst>
+  </p:cSld>
+  <p:clrMapOvr>
+    <a:masterClrMapping/>
+  </p:clrMapOvr>
+  <mc:AlternateContent xmlns:mc="http://schemas.openxmlformats.org/markup-compatibility/2006" xmlns:p14="http://schemas.microsoft.com/office/powerpoint/2010/main">
+    <mc:Choice Requires="p14">
+      <p:transition spd="med" p14:dur="700">
+        <p:fade/>
+      </p:transition>
+    </mc:Choice>
+    <mc:Fallback xmlns="">
+      <p:transition spd="med">
+        <p:fade/>
+      </p:transition>
+    </mc:Fallback>
+  </mc:AlternateContent>
+</p:sld>
+</file>
+
+<file path=ppt/slides/slide32.xml><?xml version="1.0" encoding="utf-8"?>
+<p:sld xmlns:a="http://schemas.openxmlformats.org/drawingml/2006/main" xmlns:r="http://schemas.openxmlformats.org/officeDocument/2006/relationships" xmlns:p="http://schemas.openxmlformats.org/presentationml/2006/main">
+  <p:cSld>
+    <p:spTree>
+      <p:nvGrpSpPr>
+        <p:cNvPr id="1" name=""/>
+        <p:cNvGrpSpPr/>
+        <p:nvPr/>
+      </p:nvGrpSpPr>
+      <p:grpSpPr>
+        <a:xfrm>
+          <a:off x="0" y="0"/>
+          <a:ext cx="0" cy="0"/>
+          <a:chOff x="0" y="0"/>
+          <a:chExt cx="0" cy="0"/>
+        </a:xfrm>
+      </p:grpSpPr>
+      <p:sp>
+        <p:nvSpPr>
+          <p:cNvPr id="4" name="Title 3">
+            <a:extLst>
+              <a:ext uri="{FF2B5EF4-FFF2-40B4-BE49-F238E27FC236}">
                 <a16:creationId xmlns:a16="http://schemas.microsoft.com/office/drawing/2014/main" id="{C261C424-AA7E-4C83-A265-373D787780AF}"/>
               </a:ext>
             </a:extLst>
@@ -13235,7 +13539,7 @@
 </p:sld>
 </file>
 
-<file path=ppt/slides/slide31.xml><?xml version="1.0" encoding="utf-8"?>
+<file path=ppt/slides/slide33.xml><?xml version="1.0" encoding="utf-8"?>
 <p:sld xmlns:a="http://schemas.openxmlformats.org/drawingml/2006/main" xmlns:r="http://schemas.openxmlformats.org/officeDocument/2006/relationships" xmlns:p="http://schemas.openxmlformats.org/presentationml/2006/main">
   <p:cSld>
     <p:spTree>

</xml_diff>